<commit_message>
in class linear algebra examples:
</commit_message>
<xml_diff>
--- a/course_material/week_10/week_10_presentation.pptx
+++ b/course_material/week_10/week_10_presentation.pptx
@@ -1836,7 +1836,7 @@
           <a:p>
             <a:fld id="{5CF9EFDB-215C-4120-ADCB-EAD745B7163E}" type="datetimeFigureOut">
               <a:rPr lang="en-US" smtClean="0"/>
-              <a:t>5/4/2021</a:t>
+              <a:t>5/5/2021</a:t>
             </a:fld>
             <a:endParaRPr lang="en-US"/>
           </a:p>
@@ -2552,7 +2552,7 @@
           <a:p>
             <a:fld id="{ACF1A1B0-862D-4909-A7DB-D8ADA062DFCA}" type="datetimeFigureOut">
               <a:rPr lang="en-US" dirty="0"/>
-              <a:t>5/4/2021</a:t>
+              <a:t>5/5/2021</a:t>
             </a:fld>
             <a:endParaRPr lang="en-US"/>
           </a:p>
@@ -2775,7 +2775,7 @@
           <a:p>
             <a:fld id="{7B156144-9CB7-4E3A-B87E-A382F9BE05EF}" type="datetimeFigureOut">
               <a:rPr lang="en-US" dirty="0"/>
-              <a:t>5/4/2021</a:t>
+              <a:t>5/5/2021</a:t>
             </a:fld>
             <a:endParaRPr lang="en-US"/>
           </a:p>
@@ -2953,7 +2953,7 @@
           <a:p>
             <a:fld id="{2643D55F-46AB-4791-9172-4FA8DD3A6A9C}" type="datetimeFigureOut">
               <a:rPr lang="en-US" dirty="0"/>
-              <a:t>5/4/2021</a:t>
+              <a:t>5/5/2021</a:t>
             </a:fld>
             <a:endParaRPr lang="en-US"/>
           </a:p>
@@ -3121,7 +3121,7 @@
           <a:p>
             <a:fld id="{58026881-8A08-449C-8D73-E5F201F814C1}" type="datetimeFigureOut">
               <a:rPr lang="en-US" dirty="0"/>
-              <a:t>5/4/2021</a:t>
+              <a:t>5/5/2021</a:t>
             </a:fld>
             <a:endParaRPr lang="en-US"/>
           </a:p>
@@ -3411,7 +3411,7 @@
           <a:p>
             <a:fld id="{1BEB5A5E-0C07-4E93-A112-D37B4D166B30}" type="datetimeFigureOut">
               <a:rPr lang="en-US" dirty="0"/>
-              <a:t>5/4/2021</a:t>
+              <a:t>5/5/2021</a:t>
             </a:fld>
             <a:endParaRPr lang="en-US"/>
           </a:p>
@@ -3734,7 +3734,7 @@
           <a:p>
             <a:fld id="{9E1F71C5-DC57-4358-A1EA-30C08AF6E3C5}" type="datetimeFigureOut">
               <a:rPr lang="en-US" dirty="0"/>
-              <a:t>5/4/2021</a:t>
+              <a:t>5/5/2021</a:t>
             </a:fld>
             <a:endParaRPr lang="en-US"/>
           </a:p>
@@ -4143,7 +4143,7 @@
           <a:p>
             <a:fld id="{12571DBA-DE60-4731-B773-47AAA185C143}" type="datetimeFigureOut">
               <a:rPr lang="en-US" dirty="0"/>
-              <a:t>5/4/2021</a:t>
+              <a:t>5/5/2021</a:t>
             </a:fld>
             <a:endParaRPr lang="en-US"/>
           </a:p>
@@ -4260,7 +4260,7 @@
           <a:p>
             <a:fld id="{4F170639-886C-4FCF-9EAB-ABB5DA3F3F4A}" type="datetimeFigureOut">
               <a:rPr lang="en-US" dirty="0"/>
-              <a:t>5/4/2021</a:t>
+              <a:t>5/5/2021</a:t>
             </a:fld>
             <a:endParaRPr lang="en-US"/>
           </a:p>
@@ -4355,7 +4355,7 @@
           <a:p>
             <a:fld id="{34C4A628-C83B-4C66-83F4-1711CE3738FD}" type="datetimeFigureOut">
               <a:rPr lang="en-US" dirty="0"/>
-              <a:t>5/4/2021</a:t>
+              <a:t>5/5/2021</a:t>
             </a:fld>
             <a:endParaRPr lang="en-US"/>
           </a:p>
@@ -4640,7 +4640,7 @@
           <a:p>
             <a:fld id="{B88C1D73-9400-43CA-A37F-F9B7D00DE14C}" type="datetimeFigureOut">
               <a:rPr lang="en-US" dirty="0"/>
-              <a:t>5/4/2021</a:t>
+              <a:t>5/5/2021</a:t>
             </a:fld>
             <a:endParaRPr lang="en-US"/>
           </a:p>
@@ -4912,7 +4912,7 @@
           <a:p>
             <a:fld id="{188B7711-B905-4633-B4D7-6F3A49A2E7D9}" type="datetimeFigureOut">
               <a:rPr lang="en-US" dirty="0"/>
-              <a:t>5/4/2021</a:t>
+              <a:t>5/5/2021</a:t>
             </a:fld>
             <a:endParaRPr lang="en-US"/>
           </a:p>
@@ -5162,7 +5162,7 @@
             <a:fld id="{89C235CF-BDA2-4E7E-8BBD-350479985E74}" type="datetimeFigureOut">
               <a:rPr lang="en-US" dirty="0"/>
               <a:pPr/>
-              <a:t>5/4/2021</a:t>
+              <a:t>5/5/2021</a:t>
             </a:fld>
             <a:endParaRPr lang="en-US"/>
           </a:p>
@@ -6104,23 +6104,20 @@
             <a:r>
               <a:rPr lang="en-US" b="0" i="0" dirty="0" err="1">
                 <a:solidFill>
-                  <a:schemeClr val="tx1"/>
+                  <a:schemeClr val="tx1">
+                    <a:lumMod val="95000"/>
+                  </a:schemeClr>
                 </a:solidFill>
                 <a:effectLst/>
                 <a:latin typeface="Slack-Lato"/>
               </a:rPr>
-              <a:t>OutstandingOpsEngineer</a:t>
+              <a:t>TerrificTSQL</a:t>
             </a:r>
             <a:endParaRPr lang="en-US" dirty="0">
               <a:solidFill>
-                <a:schemeClr val="tx1"/>
-              </a:solidFill>
-            </a:endParaRPr>
-          </a:p>
-          <a:p>
-            <a:endParaRPr lang="en-US" dirty="0">
-              <a:solidFill>
-                <a:schemeClr val="tx1"/>
+                <a:schemeClr val="tx1">
+                  <a:lumMod val="95000"/>
+                </a:schemeClr>
               </a:solidFill>
             </a:endParaRPr>
           </a:p>
@@ -6738,16 +6735,20 @@
             <a:r>
               <a:rPr lang="en-US" b="0" i="0" dirty="0" err="1">
                 <a:solidFill>
-                  <a:schemeClr val="tx1"/>
+                  <a:schemeClr val="tx1">
+                    <a:lumMod val="95000"/>
+                  </a:schemeClr>
                 </a:solidFill>
                 <a:effectLst/>
                 <a:latin typeface="Slack-Lato"/>
               </a:rPr>
-              <a:t>OutstandingOpsEngineer</a:t>
+              <a:t>TerrificTSQL</a:t>
             </a:r>
             <a:endParaRPr lang="en-US" dirty="0">
               <a:solidFill>
-                <a:schemeClr val="tx1"/>
+                <a:schemeClr val="tx1">
+                  <a:lumMod val="95000"/>
+                </a:schemeClr>
               </a:solidFill>
             </a:endParaRPr>
           </a:p>

</xml_diff>